<commit_message>
Polishing week 4 slides.
</commit_message>
<xml_diff>
--- a/slides/da2022-lecture-04.pptx
+++ b/slides/da2022-lecture-04.pptx
@@ -5,10 +5,10 @@
     <p:sldMasterId id="2147483648" r:id="rId1"/>
   </p:sldMasterIdLst>
   <p:notesMasterIdLst>
-    <p:notesMasterId r:id="rId21"/>
+    <p:notesMasterId r:id="rId23"/>
   </p:notesMasterIdLst>
   <p:handoutMasterIdLst>
-    <p:handoutMasterId r:id="rId22"/>
+    <p:handoutMasterId r:id="rId24"/>
   </p:handoutMasterIdLst>
   <p:sldIdLst>
     <p:sldId id="258" r:id="rId2"/>
@@ -23,13 +23,15 @@
     <p:sldId id="293" r:id="rId11"/>
     <p:sldId id="294" r:id="rId12"/>
     <p:sldId id="297" r:id="rId13"/>
-    <p:sldId id="298" r:id="rId14"/>
-    <p:sldId id="299" r:id="rId15"/>
-    <p:sldId id="300" r:id="rId16"/>
-    <p:sldId id="301" r:id="rId17"/>
-    <p:sldId id="302" r:id="rId18"/>
-    <p:sldId id="303" r:id="rId19"/>
-    <p:sldId id="304" r:id="rId20"/>
+    <p:sldId id="305" r:id="rId14"/>
+    <p:sldId id="298" r:id="rId15"/>
+    <p:sldId id="299" r:id="rId16"/>
+    <p:sldId id="300" r:id="rId17"/>
+    <p:sldId id="301" r:id="rId18"/>
+    <p:sldId id="307" r:id="rId19"/>
+    <p:sldId id="302" r:id="rId20"/>
+    <p:sldId id="303" r:id="rId21"/>
+    <p:sldId id="304" r:id="rId22"/>
   </p:sldIdLst>
   <p:sldSz cx="12192000" cy="6858000"/>
   <p:notesSz cx="6858000" cy="9144000"/>
@@ -256,7 +258,7 @@
           <a:p>
             <a:fld id="{24EFFC9C-04E4-E646-9E5F-B16BB383ECF2}" type="datetimeFigureOut">
               <a:rPr lang="en-US" smtClean="0"/>
-              <a:t>9/26/22</a:t>
+              <a:t>9/27/22</a:t>
             </a:fld>
             <a:endParaRPr lang="en-US"/>
           </a:p>
@@ -433,7 +435,7 @@
           <a:p>
             <a:fld id="{71795A92-54D0-5E4B-A08D-97789E42C8EA}" type="datetimeFigureOut">
               <a:rPr lang="en-US" smtClean="0"/>
-              <a:t>9/26/22</a:t>
+              <a:t>9/27/22</a:t>
             </a:fld>
             <a:endParaRPr lang="en-US"/>
           </a:p>
@@ -849,7 +851,7 @@
           <a:p>
             <a:fld id="{62802235-233E-0844-BB48-1C5592EE2C02}" type="slidenum">
               <a:rPr lang="en-US" smtClean="0"/>
-              <a:t>17</a:t>
+              <a:t>19</a:t>
             </a:fld>
             <a:endParaRPr lang="en-US"/>
           </a:p>
@@ -1019,7 +1021,7 @@
           <a:p>
             <a:fld id="{D1D074E6-BC95-7A40-8145-5D6390B81855}" type="datetimeFigureOut">
               <a:rPr lang="en-US" smtClean="0"/>
-              <a:t>9/26/22</a:t>
+              <a:t>9/27/22</a:t>
             </a:fld>
             <a:endParaRPr lang="en-US"/>
           </a:p>
@@ -1217,7 +1219,7 @@
           <a:p>
             <a:fld id="{D1D074E6-BC95-7A40-8145-5D6390B81855}" type="datetimeFigureOut">
               <a:rPr lang="en-US" smtClean="0"/>
-              <a:t>9/26/22</a:t>
+              <a:t>9/27/22</a:t>
             </a:fld>
             <a:endParaRPr lang="en-US"/>
           </a:p>
@@ -1425,7 +1427,7 @@
           <a:p>
             <a:fld id="{D1D074E6-BC95-7A40-8145-5D6390B81855}" type="datetimeFigureOut">
               <a:rPr lang="en-US" smtClean="0"/>
-              <a:t>9/26/22</a:t>
+              <a:t>9/27/22</a:t>
             </a:fld>
             <a:endParaRPr lang="en-US"/>
           </a:p>
@@ -1607,7 +1609,7 @@
           <a:p>
             <a:fld id="{D1D074E6-BC95-7A40-8145-5D6390B81855}" type="datetimeFigureOut">
               <a:rPr lang="en-US" smtClean="0"/>
-              <a:t>9/26/22</a:t>
+              <a:t>9/27/22</a:t>
             </a:fld>
             <a:endParaRPr lang="en-US"/>
           </a:p>
@@ -1812,7 +1814,7 @@
           <a:p>
             <a:fld id="{D1D074E6-BC95-7A40-8145-5D6390B81855}" type="datetimeFigureOut">
               <a:rPr lang="en-US" smtClean="0"/>
-              <a:t>9/26/22</a:t>
+              <a:t>9/27/22</a:t>
             </a:fld>
             <a:endParaRPr lang="en-US"/>
           </a:p>
@@ -1965,7 +1967,7 @@
           <a:p>
             <a:fld id="{D1D074E6-BC95-7A40-8145-5D6390B81855}" type="datetimeFigureOut">
               <a:rPr lang="en-US" smtClean="0"/>
-              <a:t>9/26/22</a:t>
+              <a:t>9/27/22</a:t>
             </a:fld>
             <a:endParaRPr lang="en-US"/>
           </a:p>
@@ -2230,7 +2232,7 @@
           <a:p>
             <a:fld id="{D1D074E6-BC95-7A40-8145-5D6390B81855}" type="datetimeFigureOut">
               <a:rPr lang="en-US" smtClean="0"/>
-              <a:t>9/26/22</a:t>
+              <a:t>9/27/22</a:t>
             </a:fld>
             <a:endParaRPr lang="en-US"/>
           </a:p>
@@ -2642,7 +2644,7 @@
           <a:p>
             <a:fld id="{D1D074E6-BC95-7A40-8145-5D6390B81855}" type="datetimeFigureOut">
               <a:rPr lang="en-US" smtClean="0"/>
-              <a:t>9/26/22</a:t>
+              <a:t>9/27/22</a:t>
             </a:fld>
             <a:endParaRPr lang="en-US"/>
           </a:p>
@@ -2783,7 +2785,7 @@
           <a:p>
             <a:fld id="{D1D074E6-BC95-7A40-8145-5D6390B81855}" type="datetimeFigureOut">
               <a:rPr lang="en-US" smtClean="0"/>
-              <a:t>9/26/22</a:t>
+              <a:t>9/27/22</a:t>
             </a:fld>
             <a:endParaRPr lang="en-US"/>
           </a:p>
@@ -2896,7 +2898,7 @@
           <a:p>
             <a:fld id="{D1D074E6-BC95-7A40-8145-5D6390B81855}" type="datetimeFigureOut">
               <a:rPr lang="en-US" smtClean="0"/>
-              <a:t>9/26/22</a:t>
+              <a:t>9/27/22</a:t>
             </a:fld>
             <a:endParaRPr lang="en-US"/>
           </a:p>
@@ -3207,7 +3209,7 @@
           <a:p>
             <a:fld id="{D1D074E6-BC95-7A40-8145-5D6390B81855}" type="datetimeFigureOut">
               <a:rPr lang="en-US" smtClean="0"/>
-              <a:t>9/26/22</a:t>
+              <a:t>9/27/22</a:t>
             </a:fld>
             <a:endParaRPr lang="en-US"/>
           </a:p>
@@ -3495,7 +3497,7 @@
           <a:p>
             <a:fld id="{D1D074E6-BC95-7A40-8145-5D6390B81855}" type="datetimeFigureOut">
               <a:rPr lang="en-US" smtClean="0"/>
-              <a:t>9/26/22</a:t>
+              <a:t>9/27/22</a:t>
             </a:fld>
             <a:endParaRPr lang="en-US"/>
           </a:p>
@@ -3736,7 +3738,7 @@
           <a:p>
             <a:fld id="{D1D074E6-BC95-7A40-8145-5D6390B81855}" type="datetimeFigureOut">
               <a:rPr lang="en-US" smtClean="0"/>
-              <a:t>9/26/22</a:t>
+              <a:t>9/27/22</a:t>
             </a:fld>
             <a:endParaRPr lang="en-US"/>
           </a:p>
@@ -8556,6 +8558,657 @@
       </p:grpSpPr>
       <p:sp>
         <p:nvSpPr>
+          <p:cNvPr id="3" name="Content Placeholder 2">
+            <a:extLst>
+              <a:ext uri="{FF2B5EF4-FFF2-40B4-BE49-F238E27FC236}">
+                <a16:creationId xmlns:a16="http://schemas.microsoft.com/office/drawing/2014/main" id="{D2CD4794-19CD-5840-8142-DEE108C492D0}"/>
+              </a:ext>
+            </a:extLst>
+          </p:cNvPr>
+          <p:cNvSpPr>
+            <a:spLocks noGrp="1"/>
+          </p:cNvSpPr>
+          <p:nvPr>
+            <p:ph idx="1"/>
+          </p:nvPr>
+        </p:nvSpPr>
+        <p:spPr/>
+        <p:txBody>
+          <a:bodyPr/>
+          <a:lstStyle/>
+          <a:p>
+            <a:r>
+              <a:rPr lang="en-US" dirty="0"/>
+              <a:t>Old color of node </a:t>
+            </a:r>
+            <a:r>
+              <a:rPr lang="en-US" i="1" dirty="0">
+                <a:solidFill>
+                  <a:schemeClr val="accent2"/>
+                </a:solidFill>
+                <a:latin typeface="Bernino Sans" pitchFamily="2" charset="77"/>
+              </a:rPr>
+              <a:t>v</a:t>
+            </a:r>
+            <a:r>
+              <a:rPr lang="en-US" dirty="0"/>
+              <a:t> is a set </a:t>
+            </a:r>
+            <a:r>
+              <a:rPr lang="en-US" i="1" dirty="0">
+                <a:solidFill>
+                  <a:schemeClr val="accent2"/>
+                </a:solidFill>
+                <a:latin typeface="Bernino Sans" pitchFamily="2" charset="77"/>
+              </a:rPr>
+              <a:t>S</a:t>
+            </a:r>
+            <a:r>
+              <a:rPr lang="en-US" dirty="0">
+                <a:solidFill>
+                  <a:schemeClr val="accent2"/>
+                </a:solidFill>
+                <a:latin typeface="Bernino Sans" pitchFamily="2" charset="77"/>
+              </a:rPr>
+              <a:t>(</a:t>
+            </a:r>
+            <a:r>
+              <a:rPr lang="en-US" i="1" dirty="0">
+                <a:solidFill>
+                  <a:schemeClr val="accent2"/>
+                </a:solidFill>
+                <a:latin typeface="Bernino Sans" pitchFamily="2" charset="77"/>
+              </a:rPr>
+              <a:t>v</a:t>
+            </a:r>
+            <a:r>
+              <a:rPr lang="en-US" dirty="0">
+                <a:solidFill>
+                  <a:schemeClr val="accent2"/>
+                </a:solidFill>
+                <a:latin typeface="Bernino Sans" pitchFamily="2" charset="77"/>
+              </a:rPr>
+              <a:t>)</a:t>
+            </a:r>
+            <a:r>
+              <a:rPr lang="en-US" dirty="0"/>
+              <a:t> ⊆ {1, 2, …, </a:t>
+            </a:r>
+            <a:r>
+              <a:rPr lang="en-US" i="1" dirty="0"/>
+              <a:t>m</a:t>
+            </a:r>
+            <a:r>
+              <a:rPr lang="en-US" dirty="0"/>
+              <a:t>}</a:t>
+            </a:r>
+          </a:p>
+          <a:p>
+            <a:r>
+              <a:rPr lang="en-US" b="1" dirty="0">
+                <a:latin typeface="Bernino Sans Extrabold" pitchFamily="2" charset="77"/>
+              </a:rPr>
+              <a:t>Good:</a:t>
+            </a:r>
+          </a:p>
+          <a:p>
+            <a:pPr lvl="1"/>
+            <a:r>
+              <a:rPr lang="en-US" dirty="0"/>
+              <a:t>my set is not fully covered</a:t>
+            </a:r>
+            <a:br>
+              <a:rPr lang="en-US" dirty="0"/>
+            </a:br>
+            <a:r>
+              <a:rPr lang="en-US" dirty="0"/>
+              <a:t>by my neighbors</a:t>
+            </a:r>
+          </a:p>
+          <a:p>
+            <a:pPr lvl="1"/>
+            <a:r>
+              <a:rPr lang="en-US" dirty="0"/>
+              <a:t>there is a safe choice</a:t>
+            </a:r>
+          </a:p>
+        </p:txBody>
+      </p:sp>
+      <p:cxnSp>
+        <p:nvCxnSpPr>
+          <p:cNvPr id="8" name="Straight Connector 7">
+            <a:extLst>
+              <a:ext uri="{FF2B5EF4-FFF2-40B4-BE49-F238E27FC236}">
+                <a16:creationId xmlns:a16="http://schemas.microsoft.com/office/drawing/2014/main" id="{12064181-EC5B-4745-89AD-6709D4481901}"/>
+              </a:ext>
+            </a:extLst>
+          </p:cNvPr>
+          <p:cNvCxnSpPr>
+            <a:cxnSpLocks/>
+          </p:cNvCxnSpPr>
+          <p:nvPr/>
+        </p:nvCxnSpPr>
+        <p:spPr>
+          <a:xfrm flipV="1">
+            <a:off x="8467934" y="3012728"/>
+            <a:ext cx="1985318" cy="2586681"/>
+          </a:xfrm>
+          <a:prstGeom prst="line">
+            <a:avLst/>
+          </a:prstGeom>
+          <a:ln w="38100">
+            <a:solidFill>
+              <a:schemeClr val="tx1"/>
+            </a:solidFill>
+          </a:ln>
+        </p:spPr>
+        <p:style>
+          <a:lnRef idx="1">
+            <a:schemeClr val="accent1"/>
+          </a:lnRef>
+          <a:fillRef idx="0">
+            <a:schemeClr val="accent1"/>
+          </a:fillRef>
+          <a:effectRef idx="0">
+            <a:schemeClr val="accent1"/>
+          </a:effectRef>
+          <a:fontRef idx="minor">
+            <a:schemeClr val="tx1"/>
+          </a:fontRef>
+        </p:style>
+      </p:cxnSp>
+      <p:sp>
+        <p:nvSpPr>
+          <p:cNvPr id="2" name="Title 1">
+            <a:extLst>
+              <a:ext uri="{FF2B5EF4-FFF2-40B4-BE49-F238E27FC236}">
+                <a16:creationId xmlns:a16="http://schemas.microsoft.com/office/drawing/2014/main" id="{E86F237B-ADEC-2B40-BB11-9B049A0AD6C6}"/>
+              </a:ext>
+            </a:extLst>
+          </p:cNvPr>
+          <p:cNvSpPr>
+            <a:spLocks noGrp="1"/>
+          </p:cNvSpPr>
+          <p:nvPr>
+            <p:ph type="title"/>
+          </p:nvPr>
+        </p:nvSpPr>
+        <p:spPr/>
+        <p:txBody>
+          <a:bodyPr/>
+          <a:lstStyle/>
+          <a:p>
+            <a:r>
+              <a:rPr lang="en-US" dirty="0"/>
+              <a:t>Cover-free families</a:t>
+            </a:r>
+          </a:p>
+        </p:txBody>
+      </p:sp>
+      <p:sp>
+        <p:nvSpPr>
+          <p:cNvPr id="5" name="Oval 4">
+            <a:extLst>
+              <a:ext uri="{FF2B5EF4-FFF2-40B4-BE49-F238E27FC236}">
+                <a16:creationId xmlns:a16="http://schemas.microsoft.com/office/drawing/2014/main" id="{CB4EBF53-33CF-E945-BC09-E07D7A7DECEA}"/>
+              </a:ext>
+            </a:extLst>
+          </p:cNvPr>
+          <p:cNvSpPr/>
+          <p:nvPr/>
+        </p:nvSpPr>
+        <p:spPr>
+          <a:xfrm>
+            <a:off x="9213458" y="4058933"/>
+            <a:ext cx="494270" cy="494270"/>
+          </a:xfrm>
+          <a:prstGeom prst="ellipse">
+            <a:avLst/>
+          </a:prstGeom>
+          <a:solidFill>
+            <a:schemeClr val="accent2"/>
+          </a:solidFill>
+          <a:ln>
+            <a:noFill/>
+          </a:ln>
+        </p:spPr>
+        <p:style>
+          <a:lnRef idx="2">
+            <a:schemeClr val="accent1">
+              <a:shade val="50000"/>
+            </a:schemeClr>
+          </a:lnRef>
+          <a:fillRef idx="1">
+            <a:schemeClr val="accent1"/>
+          </a:fillRef>
+          <a:effectRef idx="0">
+            <a:schemeClr val="accent1"/>
+          </a:effectRef>
+          <a:fontRef idx="minor">
+            <a:schemeClr val="lt1"/>
+          </a:fontRef>
+        </p:style>
+        <p:txBody>
+          <a:bodyPr rtlCol="0" anchor="ctr"/>
+          <a:lstStyle/>
+          <a:p>
+            <a:pPr algn="ctr">
+              <a:spcBef>
+                <a:spcPts val="2000"/>
+              </a:spcBef>
+            </a:pPr>
+            <a:r>
+              <a:rPr lang="en-US" sz="3200" i="1" dirty="0">
+                <a:latin typeface="Bernino Sans" pitchFamily="2" charset="77"/>
+              </a:rPr>
+              <a:t>v</a:t>
+            </a:r>
+          </a:p>
+        </p:txBody>
+      </p:sp>
+      <p:sp>
+        <p:nvSpPr>
+          <p:cNvPr id="12" name="TextBox 11">
+            <a:extLst>
+              <a:ext uri="{FF2B5EF4-FFF2-40B4-BE49-F238E27FC236}">
+                <a16:creationId xmlns:a16="http://schemas.microsoft.com/office/drawing/2014/main" id="{41118B2E-DE5B-A94F-86FF-F3AF56B0BBE1}"/>
+              </a:ext>
+            </a:extLst>
+          </p:cNvPr>
+          <p:cNvSpPr txBox="1"/>
+          <p:nvPr/>
+        </p:nvSpPr>
+        <p:spPr>
+          <a:xfrm>
+            <a:off x="10273568" y="3259862"/>
+            <a:ext cx="1718740" cy="646331"/>
+          </a:xfrm>
+          <a:prstGeom prst="rect">
+            <a:avLst/>
+          </a:prstGeom>
+          <a:noFill/>
+        </p:spPr>
+        <p:txBody>
+          <a:bodyPr wrap="none" rtlCol="0">
+            <a:spAutoFit/>
+          </a:bodyPr>
+          <a:lstStyle/>
+          <a:p>
+            <a:pPr algn="l"/>
+            <a:r>
+              <a:rPr lang="en-US" sz="3600" dirty="0">
+                <a:solidFill>
+                  <a:schemeClr val="accent1"/>
+                </a:solidFill>
+                <a:latin typeface="Bernino Sans" pitchFamily="2" charset="77"/>
+              </a:rPr>
+              <a:t>{1, 2, 3}</a:t>
+            </a:r>
+          </a:p>
+        </p:txBody>
+      </p:sp>
+      <p:sp>
+        <p:nvSpPr>
+          <p:cNvPr id="13" name="TextBox 12">
+            <a:extLst>
+              <a:ext uri="{FF2B5EF4-FFF2-40B4-BE49-F238E27FC236}">
+                <a16:creationId xmlns:a16="http://schemas.microsoft.com/office/drawing/2014/main" id="{EFAEE534-FDA7-B24A-8E2A-6D20F83B3870}"/>
+              </a:ext>
+            </a:extLst>
+          </p:cNvPr>
+          <p:cNvSpPr txBox="1"/>
+          <p:nvPr/>
+        </p:nvSpPr>
+        <p:spPr>
+          <a:xfrm>
+            <a:off x="9289393" y="4553203"/>
+            <a:ext cx="1778051" cy="646331"/>
+          </a:xfrm>
+          <a:prstGeom prst="rect">
+            <a:avLst/>
+          </a:prstGeom>
+          <a:noFill/>
+        </p:spPr>
+        <p:txBody>
+          <a:bodyPr wrap="none" rtlCol="0">
+            <a:spAutoFit/>
+          </a:bodyPr>
+          <a:lstStyle/>
+          <a:p>
+            <a:pPr algn="l"/>
+            <a:r>
+              <a:rPr lang="en-US" sz="3600" dirty="0">
+                <a:solidFill>
+                  <a:schemeClr val="accent2"/>
+                </a:solidFill>
+                <a:latin typeface="Bernino Sans" pitchFamily="2" charset="77"/>
+              </a:rPr>
+              <a:t>{1, 4, 7}</a:t>
+            </a:r>
+          </a:p>
+        </p:txBody>
+      </p:sp>
+      <p:sp>
+        <p:nvSpPr>
+          <p:cNvPr id="14" name="TextBox 13">
+            <a:extLst>
+              <a:ext uri="{FF2B5EF4-FFF2-40B4-BE49-F238E27FC236}">
+                <a16:creationId xmlns:a16="http://schemas.microsoft.com/office/drawing/2014/main" id="{5D8D5149-4126-E149-946F-34FB132A45E4}"/>
+              </a:ext>
+            </a:extLst>
+          </p:cNvPr>
+          <p:cNvSpPr txBox="1"/>
+          <p:nvPr/>
+        </p:nvSpPr>
+        <p:spPr>
+          <a:xfrm>
+            <a:off x="8307782" y="5846544"/>
+            <a:ext cx="1850186" cy="646331"/>
+          </a:xfrm>
+          <a:prstGeom prst="rect">
+            <a:avLst/>
+          </a:prstGeom>
+          <a:noFill/>
+        </p:spPr>
+        <p:txBody>
+          <a:bodyPr wrap="none" rtlCol="0">
+            <a:spAutoFit/>
+          </a:bodyPr>
+          <a:lstStyle/>
+          <a:p>
+            <a:pPr algn="l"/>
+            <a:r>
+              <a:rPr lang="en-US" sz="3600" dirty="0">
+                <a:solidFill>
+                  <a:schemeClr val="accent1"/>
+                </a:solidFill>
+                <a:latin typeface="Bernino Sans" pitchFamily="2" charset="77"/>
+              </a:rPr>
+              <a:t>{2, 4, 6}</a:t>
+            </a:r>
+          </a:p>
+        </p:txBody>
+      </p:sp>
+      <p:cxnSp>
+        <p:nvCxnSpPr>
+          <p:cNvPr id="15" name="Straight Connector 14">
+            <a:extLst>
+              <a:ext uri="{FF2B5EF4-FFF2-40B4-BE49-F238E27FC236}">
+                <a16:creationId xmlns:a16="http://schemas.microsoft.com/office/drawing/2014/main" id="{7D557D96-87BA-704C-8DF4-305445646C1F}"/>
+              </a:ext>
+            </a:extLst>
+          </p:cNvPr>
+          <p:cNvCxnSpPr>
+            <a:cxnSpLocks/>
+          </p:cNvCxnSpPr>
+          <p:nvPr/>
+        </p:nvCxnSpPr>
+        <p:spPr>
+          <a:xfrm flipV="1">
+            <a:off x="7272102" y="5599410"/>
+            <a:ext cx="1171758" cy="577553"/>
+          </a:xfrm>
+          <a:prstGeom prst="line">
+            <a:avLst/>
+          </a:prstGeom>
+          <a:ln w="38100">
+            <a:solidFill>
+              <a:schemeClr val="tx1"/>
+            </a:solidFill>
+            <a:prstDash val="sysDash"/>
+          </a:ln>
+        </p:spPr>
+        <p:style>
+          <a:lnRef idx="1">
+            <a:schemeClr val="accent1"/>
+          </a:lnRef>
+          <a:fillRef idx="0">
+            <a:schemeClr val="accent1"/>
+          </a:fillRef>
+          <a:effectRef idx="0">
+            <a:schemeClr val="accent1"/>
+          </a:effectRef>
+          <a:fontRef idx="minor">
+            <a:schemeClr val="tx1"/>
+          </a:fontRef>
+        </p:style>
+      </p:cxnSp>
+      <p:cxnSp>
+        <p:nvCxnSpPr>
+          <p:cNvPr id="18" name="Straight Connector 17">
+            <a:extLst>
+              <a:ext uri="{FF2B5EF4-FFF2-40B4-BE49-F238E27FC236}">
+                <a16:creationId xmlns:a16="http://schemas.microsoft.com/office/drawing/2014/main" id="{CF9E4C70-4D8E-4F44-8725-9E4C9637E839}"/>
+              </a:ext>
+            </a:extLst>
+          </p:cNvPr>
+          <p:cNvCxnSpPr>
+            <a:cxnSpLocks/>
+          </p:cNvCxnSpPr>
+          <p:nvPr/>
+        </p:nvCxnSpPr>
+        <p:spPr>
+          <a:xfrm flipV="1">
+            <a:off x="7857981" y="5599410"/>
+            <a:ext cx="585879" cy="893465"/>
+          </a:xfrm>
+          <a:prstGeom prst="line">
+            <a:avLst/>
+          </a:prstGeom>
+          <a:ln w="38100">
+            <a:solidFill>
+              <a:schemeClr val="tx1"/>
+            </a:solidFill>
+            <a:prstDash val="sysDash"/>
+          </a:ln>
+        </p:spPr>
+        <p:style>
+          <a:lnRef idx="1">
+            <a:schemeClr val="accent1"/>
+          </a:lnRef>
+          <a:fillRef idx="0">
+            <a:schemeClr val="accent1"/>
+          </a:fillRef>
+          <a:effectRef idx="0">
+            <a:schemeClr val="accent1"/>
+          </a:effectRef>
+          <a:fontRef idx="minor">
+            <a:schemeClr val="tx1"/>
+          </a:fontRef>
+        </p:style>
+      </p:cxnSp>
+      <p:sp>
+        <p:nvSpPr>
+          <p:cNvPr id="4" name="Oval 3">
+            <a:extLst>
+              <a:ext uri="{FF2B5EF4-FFF2-40B4-BE49-F238E27FC236}">
+                <a16:creationId xmlns:a16="http://schemas.microsoft.com/office/drawing/2014/main" id="{EAEF7454-C9D2-C145-BFA9-987E13760859}"/>
+              </a:ext>
+            </a:extLst>
+          </p:cNvPr>
+          <p:cNvSpPr/>
+          <p:nvPr/>
+        </p:nvSpPr>
+        <p:spPr>
+          <a:xfrm>
+            <a:off x="8220799" y="5352274"/>
+            <a:ext cx="494270" cy="494270"/>
+          </a:xfrm>
+          <a:prstGeom prst="ellipse">
+            <a:avLst/>
+          </a:prstGeom>
+          <a:solidFill>
+            <a:schemeClr val="accent1"/>
+          </a:solidFill>
+          <a:ln>
+            <a:noFill/>
+          </a:ln>
+        </p:spPr>
+        <p:style>
+          <a:lnRef idx="2">
+            <a:schemeClr val="accent1">
+              <a:shade val="50000"/>
+            </a:schemeClr>
+          </a:lnRef>
+          <a:fillRef idx="1">
+            <a:schemeClr val="accent1"/>
+          </a:fillRef>
+          <a:effectRef idx="0">
+            <a:schemeClr val="accent1"/>
+          </a:effectRef>
+          <a:fontRef idx="minor">
+            <a:schemeClr val="lt1"/>
+          </a:fontRef>
+        </p:style>
+        <p:txBody>
+          <a:bodyPr rtlCol="0" anchor="ctr"/>
+          <a:lstStyle/>
+          <a:p>
+            <a:pPr algn="ctr">
+              <a:spcBef>
+                <a:spcPts val="2000"/>
+              </a:spcBef>
+            </a:pPr>
+            <a:endParaRPr lang="en-US" sz="3200" b="1" dirty="0">
+              <a:latin typeface="Bernino Sans Semibold" pitchFamily="2" charset="77"/>
+            </a:endParaRPr>
+          </a:p>
+        </p:txBody>
+      </p:sp>
+      <p:cxnSp>
+        <p:nvCxnSpPr>
+          <p:cNvPr id="21" name="Straight Connector 20">
+            <a:extLst>
+              <a:ext uri="{FF2B5EF4-FFF2-40B4-BE49-F238E27FC236}">
+                <a16:creationId xmlns:a16="http://schemas.microsoft.com/office/drawing/2014/main" id="{B253B852-BE19-6C4B-A78E-2D170A0320D2}"/>
+              </a:ext>
+            </a:extLst>
+          </p:cNvPr>
+          <p:cNvCxnSpPr>
+            <a:cxnSpLocks/>
+          </p:cNvCxnSpPr>
+          <p:nvPr/>
+        </p:nvCxnSpPr>
+        <p:spPr>
+          <a:xfrm flipV="1">
+            <a:off x="10464292" y="2449680"/>
+            <a:ext cx="1171758" cy="577553"/>
+          </a:xfrm>
+          <a:prstGeom prst="line">
+            <a:avLst/>
+          </a:prstGeom>
+          <a:ln w="38100">
+            <a:solidFill>
+              <a:schemeClr val="tx1"/>
+            </a:solidFill>
+            <a:prstDash val="sysDash"/>
+          </a:ln>
+        </p:spPr>
+        <p:style>
+          <a:lnRef idx="1">
+            <a:schemeClr val="accent1"/>
+          </a:lnRef>
+          <a:fillRef idx="0">
+            <a:schemeClr val="accent1"/>
+          </a:fillRef>
+          <a:effectRef idx="0">
+            <a:schemeClr val="accent1"/>
+          </a:effectRef>
+          <a:fontRef idx="minor">
+            <a:schemeClr val="tx1"/>
+          </a:fontRef>
+        </p:style>
+      </p:cxnSp>
+      <p:sp>
+        <p:nvSpPr>
+          <p:cNvPr id="6" name="Oval 5">
+            <a:extLst>
+              <a:ext uri="{FF2B5EF4-FFF2-40B4-BE49-F238E27FC236}">
+                <a16:creationId xmlns:a16="http://schemas.microsoft.com/office/drawing/2014/main" id="{CD57E29C-27BB-6344-BCB3-9DFF7765F97B}"/>
+              </a:ext>
+            </a:extLst>
+          </p:cNvPr>
+          <p:cNvSpPr/>
+          <p:nvPr/>
+        </p:nvSpPr>
+        <p:spPr>
+          <a:xfrm>
+            <a:off x="10206117" y="2765592"/>
+            <a:ext cx="494270" cy="494270"/>
+          </a:xfrm>
+          <a:prstGeom prst="ellipse">
+            <a:avLst/>
+          </a:prstGeom>
+          <a:solidFill>
+            <a:schemeClr val="accent1"/>
+          </a:solidFill>
+          <a:ln>
+            <a:noFill/>
+          </a:ln>
+        </p:spPr>
+        <p:style>
+          <a:lnRef idx="2">
+            <a:schemeClr val="accent1">
+              <a:shade val="50000"/>
+            </a:schemeClr>
+          </a:lnRef>
+          <a:fillRef idx="1">
+            <a:schemeClr val="accent1"/>
+          </a:fillRef>
+          <a:effectRef idx="0">
+            <a:schemeClr val="accent1"/>
+          </a:effectRef>
+          <a:fontRef idx="minor">
+            <a:schemeClr val="lt1"/>
+          </a:fontRef>
+        </p:style>
+        <p:txBody>
+          <a:bodyPr rtlCol="0" anchor="ctr"/>
+          <a:lstStyle/>
+          <a:p>
+            <a:pPr algn="ctr">
+              <a:spcBef>
+                <a:spcPts val="2000"/>
+              </a:spcBef>
+            </a:pPr>
+            <a:endParaRPr lang="en-US" sz="3200" b="1" dirty="0">
+              <a:latin typeface="Bernino Sans Semibold" pitchFamily="2" charset="77"/>
+            </a:endParaRPr>
+          </a:p>
+        </p:txBody>
+      </p:sp>
+    </p:spTree>
+    <p:extLst>
+      <p:ext uri="{BB962C8B-B14F-4D97-AF65-F5344CB8AC3E}">
+        <p14:creationId xmlns:p14="http://schemas.microsoft.com/office/powerpoint/2010/main" val="2116561702"/>
+      </p:ext>
+    </p:extLst>
+  </p:cSld>
+  <p:clrMapOvr>
+    <a:masterClrMapping/>
+  </p:clrMapOvr>
+</p:sld>
+</file>
+
+<file path=ppt/slides/slide14.xml><?xml version="1.0" encoding="utf-8"?>
+<p:sld xmlns:a="http://schemas.openxmlformats.org/drawingml/2006/main" xmlns:r="http://schemas.openxmlformats.org/officeDocument/2006/relationships" xmlns:p="http://schemas.openxmlformats.org/presentationml/2006/main">
+  <p:cSld>
+    <p:spTree>
+      <p:nvGrpSpPr>
+        <p:cNvPr id="1" name=""/>
+        <p:cNvGrpSpPr/>
+        <p:nvPr/>
+      </p:nvGrpSpPr>
+      <p:grpSpPr>
+        <a:xfrm>
+          <a:off x="0" y="0"/>
+          <a:ext cx="0" cy="0"/>
+          <a:chOff x="0" y="0"/>
+          <a:chExt cx="0" cy="0"/>
+        </a:xfrm>
+      </p:grpSpPr>
+      <p:sp>
+        <p:nvSpPr>
           <p:cNvPr id="2" name="Title 1">
             <a:extLst>
               <a:ext uri="{FF2B5EF4-FFF2-40B4-BE49-F238E27FC236}">
@@ -10556,7 +11209,7 @@
 </p:sld>
 </file>
 
-<file path=ppt/slides/slide14.xml><?xml version="1.0" encoding="utf-8"?>
+<file path=ppt/slides/slide15.xml><?xml version="1.0" encoding="utf-8"?>
 <p:sld xmlns:a="http://schemas.openxmlformats.org/drawingml/2006/main" xmlns:r="http://schemas.openxmlformats.org/officeDocument/2006/relationships" xmlns:p="http://schemas.openxmlformats.org/presentationml/2006/main">
   <p:cSld>
     <p:spTree>
@@ -12815,254 +13468,6 @@
 </p:sld>
 </file>
 
-<file path=ppt/slides/slide15.xml><?xml version="1.0" encoding="utf-8"?>
-<p:sld xmlns:a="http://schemas.openxmlformats.org/drawingml/2006/main" xmlns:r="http://schemas.openxmlformats.org/officeDocument/2006/relationships" xmlns:p="http://schemas.openxmlformats.org/presentationml/2006/main">
-  <p:cSld>
-    <p:spTree>
-      <p:nvGrpSpPr>
-        <p:cNvPr id="1" name=""/>
-        <p:cNvGrpSpPr/>
-        <p:nvPr/>
-      </p:nvGrpSpPr>
-      <p:grpSpPr>
-        <a:xfrm>
-          <a:off x="0" y="0"/>
-          <a:ext cx="0" cy="0"/>
-          <a:chOff x="0" y="0"/>
-          <a:chExt cx="0" cy="0"/>
-        </a:xfrm>
-      </p:grpSpPr>
-      <p:sp>
-        <p:nvSpPr>
-          <p:cNvPr id="2" name="Title 1">
-            <a:extLst>
-              <a:ext uri="{FF2B5EF4-FFF2-40B4-BE49-F238E27FC236}">
-                <a16:creationId xmlns:a16="http://schemas.microsoft.com/office/drawing/2014/main" id="{6523F48F-3C49-974F-8D29-16FD8C5A35F7}"/>
-              </a:ext>
-            </a:extLst>
-          </p:cNvPr>
-          <p:cNvSpPr>
-            <a:spLocks noGrp="1"/>
-          </p:cNvSpPr>
-          <p:nvPr>
-            <p:ph type="title"/>
-          </p:nvPr>
-        </p:nvSpPr>
-        <p:spPr/>
-        <p:txBody>
-          <a:bodyPr/>
-          <a:lstStyle/>
-          <a:p>
-            <a:r>
-              <a:rPr lang="en-US" dirty="0"/>
-              <a:t>Cover-free families</a:t>
-            </a:r>
-          </a:p>
-        </p:txBody>
-      </p:sp>
-      <p:sp>
-        <p:nvSpPr>
-          <p:cNvPr id="3" name="Content Placeholder 2">
-            <a:extLst>
-              <a:ext uri="{FF2B5EF4-FFF2-40B4-BE49-F238E27FC236}">
-                <a16:creationId xmlns:a16="http://schemas.microsoft.com/office/drawing/2014/main" id="{A6A218F6-CFBB-094D-B72B-83E40D36B67E}"/>
-              </a:ext>
-            </a:extLst>
-          </p:cNvPr>
-          <p:cNvSpPr>
-            <a:spLocks noGrp="1"/>
-          </p:cNvSpPr>
-          <p:nvPr>
-            <p:ph idx="1"/>
-          </p:nvPr>
-        </p:nvSpPr>
-        <p:spPr>
-          <a:xfrm>
-            <a:off x="838200" y="1825625"/>
-            <a:ext cx="10515600" cy="4351338"/>
-          </a:xfrm>
-        </p:spPr>
-        <p:txBody>
-          <a:bodyPr/>
-          <a:lstStyle/>
-          <a:p>
-            <a:r>
-              <a:rPr lang="en-US" dirty="0"/>
-              <a:t>Assume: </a:t>
-            </a:r>
-            <a:r>
-              <a:rPr lang="en-US" b="1" i="1" dirty="0">
-                <a:solidFill>
-                  <a:schemeClr val="accent2"/>
-                </a:solidFill>
-                <a:latin typeface="Bernino Sans Semibold" pitchFamily="2" charset="77"/>
-              </a:rPr>
-              <a:t>x</a:t>
-            </a:r>
-            <a:r>
-              <a:rPr lang="en-US" dirty="0"/>
-              <a:t>-coloring, maximum degree </a:t>
-            </a:r>
-            <a:r>
-              <a:rPr lang="el-GR" b="1" dirty="0">
-                <a:latin typeface="Bernino Sans Semibold" pitchFamily="2" charset="77"/>
-              </a:rPr>
-              <a:t>Δ</a:t>
-            </a:r>
-            <a:endParaRPr lang="en-US" b="1" dirty="0">
-              <a:latin typeface="Bernino Sans Semibold" pitchFamily="2" charset="77"/>
-            </a:endParaRPr>
-          </a:p>
-          <a:p>
-            <a:r>
-              <a:rPr lang="en-US" dirty="0"/>
-              <a:t>There is a </a:t>
-            </a:r>
-            <a:r>
-              <a:rPr lang="el-GR" b="1" dirty="0">
-                <a:latin typeface="Bernino Sans Semibold" pitchFamily="2" charset="77"/>
-              </a:rPr>
-              <a:t>Δ</a:t>
-            </a:r>
-            <a:r>
-              <a:rPr lang="en-US" dirty="0"/>
-              <a:t>-cover-free family </a:t>
-            </a:r>
-            <a:r>
-              <a:rPr lang="en-US" i="1" dirty="0"/>
-              <a:t>S</a:t>
-            </a:r>
-            <a:r>
-              <a:rPr lang="en-US" baseline="-25000" dirty="0"/>
-              <a:t>1</a:t>
-            </a:r>
-            <a:r>
-              <a:rPr lang="en-US" dirty="0"/>
-              <a:t>, </a:t>
-            </a:r>
-            <a:r>
-              <a:rPr lang="en-US" i="1" dirty="0"/>
-              <a:t>S</a:t>
-            </a:r>
-            <a:r>
-              <a:rPr lang="en-US" baseline="-25000" dirty="0"/>
-              <a:t>2</a:t>
-            </a:r>
-            <a:r>
-              <a:rPr lang="en-US" dirty="0"/>
-              <a:t>, …, </a:t>
-            </a:r>
-            <a:r>
-              <a:rPr lang="en-US" i="1" dirty="0" err="1"/>
-              <a:t>S</a:t>
-            </a:r>
-            <a:r>
-              <a:rPr lang="en-US" b="1" i="1" baseline="-25000" dirty="0" err="1">
-                <a:solidFill>
-                  <a:schemeClr val="accent2"/>
-                </a:solidFill>
-                <a:latin typeface="Bernino Sans Semibold" pitchFamily="2" charset="77"/>
-              </a:rPr>
-              <a:t>x</a:t>
-            </a:r>
-            <a:endParaRPr lang="en-US" b="1" i="1" baseline="-25000" dirty="0">
-              <a:solidFill>
-                <a:schemeClr val="accent2"/>
-              </a:solidFill>
-              <a:latin typeface="Bernino Sans Semibold" pitchFamily="2" charset="77"/>
-            </a:endParaRPr>
-          </a:p>
-          <a:p>
-            <a:pPr lvl="1"/>
-            <a:r>
-              <a:rPr lang="en-US" dirty="0"/>
-              <a:t>all subsets of {1, 2, …, </a:t>
-            </a:r>
-            <a:r>
-              <a:rPr lang="en-US" b="1" i="1" dirty="0">
-                <a:solidFill>
-                  <a:schemeClr val="accent1"/>
-                </a:solidFill>
-                <a:latin typeface="Bernino Sans Semibold" pitchFamily="2" charset="77"/>
-              </a:rPr>
-              <a:t>m</a:t>
-            </a:r>
-            <a:r>
-              <a:rPr lang="en-US" dirty="0"/>
-              <a:t>}</a:t>
-            </a:r>
-          </a:p>
-          <a:p>
-            <a:r>
-              <a:rPr lang="en-US" dirty="0"/>
-              <a:t>Nodes of color </a:t>
-            </a:r>
-            <a:r>
-              <a:rPr lang="en-US" i="1" dirty="0"/>
-              <a:t>c</a:t>
-            </a:r>
-            <a:r>
-              <a:rPr lang="en-US" dirty="0"/>
-              <a:t> pick set </a:t>
-            </a:r>
-            <a:r>
-              <a:rPr lang="en-US" i="1" dirty="0"/>
-              <a:t>S</a:t>
-            </a:r>
-            <a:r>
-              <a:rPr lang="en-US" i="1" baseline="-25000" dirty="0"/>
-              <a:t>c</a:t>
-            </a:r>
-          </a:p>
-          <a:p>
-            <a:r>
-              <a:rPr lang="en-US" dirty="0"/>
-              <a:t>There is always a safe choice for any node!</a:t>
-            </a:r>
-          </a:p>
-          <a:p>
-            <a:r>
-              <a:rPr lang="en-US" dirty="0"/>
-              <a:t>Color reduction from </a:t>
-            </a:r>
-            <a:r>
-              <a:rPr lang="en-US" b="1" i="1" dirty="0">
-                <a:solidFill>
-                  <a:schemeClr val="accent2"/>
-                </a:solidFill>
-                <a:latin typeface="Bernino Sans Semibold" pitchFamily="2" charset="77"/>
-              </a:rPr>
-              <a:t>x</a:t>
-            </a:r>
-            <a:r>
-              <a:rPr lang="en-US" dirty="0"/>
-              <a:t> to </a:t>
-            </a:r>
-            <a:r>
-              <a:rPr lang="en-US" b="1" i="1" dirty="0">
-                <a:solidFill>
-                  <a:schemeClr val="accent1"/>
-                </a:solidFill>
-                <a:latin typeface="Bernino Sans Semibold" pitchFamily="2" charset="77"/>
-              </a:rPr>
-              <a:t>m</a:t>
-            </a:r>
-          </a:p>
-        </p:txBody>
-      </p:sp>
-    </p:spTree>
-    <p:extLst>
-      <p:ext uri="{BB962C8B-B14F-4D97-AF65-F5344CB8AC3E}">
-        <p14:creationId xmlns:p14="http://schemas.microsoft.com/office/powerpoint/2010/main" val="541543096"/>
-      </p:ext>
-    </p:extLst>
-  </p:cSld>
-  <p:clrMapOvr>
-    <a:masterClrMapping/>
-  </p:clrMapOvr>
-</p:sld>
-</file>
-
 <file path=ppt/slides/slide16.xml><?xml version="1.0" encoding="utf-8"?>
 <p:sld xmlns:a="http://schemas.openxmlformats.org/drawingml/2006/main" xmlns:r="http://schemas.openxmlformats.org/officeDocument/2006/relationships" xmlns:p="http://schemas.openxmlformats.org/presentationml/2006/main">
   <p:cSld>
@@ -13135,6 +13540,395 @@
           <a:lstStyle/>
           <a:p>
             <a:r>
+              <a:rPr lang="en-US" dirty="0"/>
+              <a:t>Assume: </a:t>
+            </a:r>
+            <a:r>
+              <a:rPr lang="en-US" b="1" i="1" dirty="0">
+                <a:solidFill>
+                  <a:schemeClr val="accent2"/>
+                </a:solidFill>
+                <a:latin typeface="Bernino Sans Semibold" pitchFamily="2" charset="77"/>
+              </a:rPr>
+              <a:t>x</a:t>
+            </a:r>
+            <a:r>
+              <a:rPr lang="en-US" dirty="0"/>
+              <a:t>-coloring, maximum degree </a:t>
+            </a:r>
+            <a:r>
+              <a:rPr lang="el-GR" b="1" dirty="0">
+                <a:latin typeface="Bernino Sans Semibold" pitchFamily="2" charset="77"/>
+              </a:rPr>
+              <a:t>Δ</a:t>
+            </a:r>
+            <a:endParaRPr lang="en-US" b="1" dirty="0">
+              <a:latin typeface="Bernino Sans Semibold" pitchFamily="2" charset="77"/>
+            </a:endParaRPr>
+          </a:p>
+          <a:p>
+            <a:r>
+              <a:rPr lang="en-US" dirty="0"/>
+              <a:t>Assume: a </a:t>
+            </a:r>
+            <a:r>
+              <a:rPr lang="el-GR" b="1" dirty="0">
+                <a:latin typeface="Bernino Sans Semibold" pitchFamily="2" charset="77"/>
+              </a:rPr>
+              <a:t>Δ</a:t>
+            </a:r>
+            <a:r>
+              <a:rPr lang="en-US" dirty="0"/>
+              <a:t>-cover-free family </a:t>
+            </a:r>
+            <a:r>
+              <a:rPr lang="en-US" i="1" dirty="0"/>
+              <a:t>S</a:t>
+            </a:r>
+            <a:r>
+              <a:rPr lang="en-US" baseline="-25000" dirty="0"/>
+              <a:t>1</a:t>
+            </a:r>
+            <a:r>
+              <a:rPr lang="en-US" dirty="0"/>
+              <a:t>, </a:t>
+            </a:r>
+            <a:r>
+              <a:rPr lang="en-US" i="1" dirty="0"/>
+              <a:t>S</a:t>
+            </a:r>
+            <a:r>
+              <a:rPr lang="en-US" baseline="-25000" dirty="0"/>
+              <a:t>2</a:t>
+            </a:r>
+            <a:r>
+              <a:rPr lang="en-US" dirty="0"/>
+              <a:t>, …, </a:t>
+            </a:r>
+            <a:r>
+              <a:rPr lang="en-US" i="1" dirty="0" err="1"/>
+              <a:t>S</a:t>
+            </a:r>
+            <a:r>
+              <a:rPr lang="en-US" b="1" i="1" baseline="-25000" dirty="0" err="1">
+                <a:solidFill>
+                  <a:schemeClr val="accent2"/>
+                </a:solidFill>
+                <a:latin typeface="Bernino Sans Semibold" pitchFamily="2" charset="77"/>
+              </a:rPr>
+              <a:t>x</a:t>
+            </a:r>
+            <a:endParaRPr lang="en-US" b="1" i="1" baseline="-25000" dirty="0">
+              <a:solidFill>
+                <a:schemeClr val="accent2"/>
+              </a:solidFill>
+              <a:latin typeface="Bernino Sans Semibold" pitchFamily="2" charset="77"/>
+            </a:endParaRPr>
+          </a:p>
+          <a:p>
+            <a:pPr lvl="1"/>
+            <a:r>
+              <a:rPr lang="en-US" dirty="0"/>
+              <a:t>all subsets of {1, 2, …, </a:t>
+            </a:r>
+            <a:r>
+              <a:rPr lang="en-US" b="1" i="1" dirty="0">
+                <a:solidFill>
+                  <a:schemeClr val="accent1"/>
+                </a:solidFill>
+                <a:latin typeface="Bernino Sans Semibold" pitchFamily="2" charset="77"/>
+              </a:rPr>
+              <a:t>m</a:t>
+            </a:r>
+            <a:r>
+              <a:rPr lang="en-US" dirty="0"/>
+              <a:t>}</a:t>
+            </a:r>
+          </a:p>
+          <a:p>
+            <a:r>
+              <a:rPr lang="en-US" dirty="0"/>
+              <a:t>Nodes of color </a:t>
+            </a:r>
+            <a:r>
+              <a:rPr lang="en-US" i="1" dirty="0"/>
+              <a:t>c</a:t>
+            </a:r>
+            <a:r>
+              <a:rPr lang="en-US" dirty="0"/>
+              <a:t> pick set </a:t>
+            </a:r>
+            <a:r>
+              <a:rPr lang="en-US" i="1" dirty="0"/>
+              <a:t>S</a:t>
+            </a:r>
+            <a:r>
+              <a:rPr lang="en-US" i="1" baseline="-25000" dirty="0"/>
+              <a:t>c</a:t>
+            </a:r>
+          </a:p>
+          <a:p>
+            <a:r>
+              <a:rPr lang="en-US" dirty="0"/>
+              <a:t>There is always a safe choice for any node!</a:t>
+            </a:r>
+          </a:p>
+          <a:p>
+            <a:r>
+              <a:rPr lang="en-US" dirty="0"/>
+              <a:t>Color reduction from </a:t>
+            </a:r>
+            <a:r>
+              <a:rPr lang="en-US" b="1" i="1" dirty="0">
+                <a:solidFill>
+                  <a:schemeClr val="accent2"/>
+                </a:solidFill>
+                <a:latin typeface="Bernino Sans Semibold" pitchFamily="2" charset="77"/>
+              </a:rPr>
+              <a:t>x</a:t>
+            </a:r>
+            <a:r>
+              <a:rPr lang="en-US" dirty="0"/>
+              <a:t> to </a:t>
+            </a:r>
+            <a:r>
+              <a:rPr lang="en-US" b="1" i="1" dirty="0">
+                <a:solidFill>
+                  <a:schemeClr val="accent1"/>
+                </a:solidFill>
+                <a:latin typeface="Bernino Sans Semibold" pitchFamily="2" charset="77"/>
+              </a:rPr>
+              <a:t>m</a:t>
+            </a:r>
+          </a:p>
+        </p:txBody>
+      </p:sp>
+    </p:spTree>
+    <p:extLst>
+      <p:ext uri="{BB962C8B-B14F-4D97-AF65-F5344CB8AC3E}">
+        <p14:creationId xmlns:p14="http://schemas.microsoft.com/office/powerpoint/2010/main" val="541543096"/>
+      </p:ext>
+    </p:extLst>
+  </p:cSld>
+  <p:clrMapOvr>
+    <a:masterClrMapping/>
+  </p:clrMapOvr>
+  <p:timing>
+    <p:tnLst>
+      <p:par>
+        <p:cTn id="1" dur="indefinite" restart="never" nodeType="tmRoot">
+          <p:childTnLst>
+            <p:seq concurrent="1" nextAc="seek">
+              <p:cTn id="2" dur="indefinite" nodeType="mainSeq">
+                <p:childTnLst>
+                  <p:par>
+                    <p:cTn id="3" fill="hold">
+                      <p:stCondLst>
+                        <p:cond delay="indefinite"/>
+                      </p:stCondLst>
+                      <p:childTnLst>
+                        <p:par>
+                          <p:cTn id="4" fill="hold">
+                            <p:stCondLst>
+                              <p:cond delay="0"/>
+                            </p:stCondLst>
+                            <p:childTnLst>
+                              <p:par>
+                                <p:cTn id="5" presetID="1" presetClass="entr" presetSubtype="0" fill="hold" nodeType="clickEffect">
+                                  <p:stCondLst>
+                                    <p:cond delay="0"/>
+                                  </p:stCondLst>
+                                  <p:childTnLst>
+                                    <p:set>
+                                      <p:cBhvr>
+                                        <p:cTn id="6" dur="1" fill="hold">
+                                          <p:stCondLst>
+                                            <p:cond delay="0"/>
+                                          </p:stCondLst>
+                                        </p:cTn>
+                                        <p:tgtEl>
+                                          <p:spTgt spid="3">
+                                            <p:txEl>
+                                              <p:pRg st="3" end="3"/>
+                                            </p:txEl>
+                                          </p:spTgt>
+                                        </p:tgtEl>
+                                        <p:attrNameLst>
+                                          <p:attrName>style.visibility</p:attrName>
+                                        </p:attrNameLst>
+                                      </p:cBhvr>
+                                      <p:to>
+                                        <p:strVal val="visible"/>
+                                      </p:to>
+                                    </p:set>
+                                  </p:childTnLst>
+                                </p:cTn>
+                              </p:par>
+                              <p:par>
+                                <p:cTn id="7" presetID="1" presetClass="entr" presetSubtype="0" fill="hold" nodeType="withEffect">
+                                  <p:stCondLst>
+                                    <p:cond delay="0"/>
+                                  </p:stCondLst>
+                                  <p:childTnLst>
+                                    <p:set>
+                                      <p:cBhvr>
+                                        <p:cTn id="8" dur="1" fill="hold">
+                                          <p:stCondLst>
+                                            <p:cond delay="0"/>
+                                          </p:stCondLst>
+                                        </p:cTn>
+                                        <p:tgtEl>
+                                          <p:spTgt spid="3">
+                                            <p:txEl>
+                                              <p:pRg st="4" end="4"/>
+                                            </p:txEl>
+                                          </p:spTgt>
+                                        </p:tgtEl>
+                                        <p:attrNameLst>
+                                          <p:attrName>style.visibility</p:attrName>
+                                        </p:attrNameLst>
+                                      </p:cBhvr>
+                                      <p:to>
+                                        <p:strVal val="visible"/>
+                                      </p:to>
+                                    </p:set>
+                                  </p:childTnLst>
+                                </p:cTn>
+                              </p:par>
+                              <p:par>
+                                <p:cTn id="9" presetID="1" presetClass="entr" presetSubtype="0" fill="hold" nodeType="withEffect">
+                                  <p:stCondLst>
+                                    <p:cond delay="0"/>
+                                  </p:stCondLst>
+                                  <p:childTnLst>
+                                    <p:set>
+                                      <p:cBhvr>
+                                        <p:cTn id="10" dur="1" fill="hold">
+                                          <p:stCondLst>
+                                            <p:cond delay="0"/>
+                                          </p:stCondLst>
+                                        </p:cTn>
+                                        <p:tgtEl>
+                                          <p:spTgt spid="3">
+                                            <p:txEl>
+                                              <p:pRg st="5" end="5"/>
+                                            </p:txEl>
+                                          </p:spTgt>
+                                        </p:tgtEl>
+                                        <p:attrNameLst>
+                                          <p:attrName>style.visibility</p:attrName>
+                                        </p:attrNameLst>
+                                      </p:cBhvr>
+                                      <p:to>
+                                        <p:strVal val="visible"/>
+                                      </p:to>
+                                    </p:set>
+                                  </p:childTnLst>
+                                </p:cTn>
+                              </p:par>
+                            </p:childTnLst>
+                          </p:cTn>
+                        </p:par>
+                      </p:childTnLst>
+                    </p:cTn>
+                  </p:par>
+                </p:childTnLst>
+              </p:cTn>
+              <p:prevCondLst>
+                <p:cond evt="onPrev" delay="0">
+                  <p:tgtEl>
+                    <p:sldTgt/>
+                  </p:tgtEl>
+                </p:cond>
+              </p:prevCondLst>
+              <p:nextCondLst>
+                <p:cond evt="onNext" delay="0">
+                  <p:tgtEl>
+                    <p:sldTgt/>
+                  </p:tgtEl>
+                </p:cond>
+              </p:nextCondLst>
+            </p:seq>
+          </p:childTnLst>
+        </p:cTn>
+      </p:par>
+    </p:tnLst>
+  </p:timing>
+</p:sld>
+</file>
+
+<file path=ppt/slides/slide17.xml><?xml version="1.0" encoding="utf-8"?>
+<p:sld xmlns:a="http://schemas.openxmlformats.org/drawingml/2006/main" xmlns:r="http://schemas.openxmlformats.org/officeDocument/2006/relationships" xmlns:p="http://schemas.openxmlformats.org/presentationml/2006/main">
+  <p:cSld>
+    <p:spTree>
+      <p:nvGrpSpPr>
+        <p:cNvPr id="1" name=""/>
+        <p:cNvGrpSpPr/>
+        <p:nvPr/>
+      </p:nvGrpSpPr>
+      <p:grpSpPr>
+        <a:xfrm>
+          <a:off x="0" y="0"/>
+          <a:ext cx="0" cy="0"/>
+          <a:chOff x="0" y="0"/>
+          <a:chExt cx="0" cy="0"/>
+        </a:xfrm>
+      </p:grpSpPr>
+      <p:sp>
+        <p:nvSpPr>
+          <p:cNvPr id="2" name="Title 1">
+            <a:extLst>
+              <a:ext uri="{FF2B5EF4-FFF2-40B4-BE49-F238E27FC236}">
+                <a16:creationId xmlns:a16="http://schemas.microsoft.com/office/drawing/2014/main" id="{6523F48F-3C49-974F-8D29-16FD8C5A35F7}"/>
+              </a:ext>
+            </a:extLst>
+          </p:cNvPr>
+          <p:cNvSpPr>
+            <a:spLocks noGrp="1"/>
+          </p:cNvSpPr>
+          <p:nvPr>
+            <p:ph type="title"/>
+          </p:nvPr>
+        </p:nvSpPr>
+        <p:spPr/>
+        <p:txBody>
+          <a:bodyPr/>
+          <a:lstStyle/>
+          <a:p>
+            <a:r>
+              <a:rPr lang="en-US" dirty="0"/>
+              <a:t>Cover-free families</a:t>
+            </a:r>
+          </a:p>
+        </p:txBody>
+      </p:sp>
+      <p:sp>
+        <p:nvSpPr>
+          <p:cNvPr id="3" name="Content Placeholder 2">
+            <a:extLst>
+              <a:ext uri="{FF2B5EF4-FFF2-40B4-BE49-F238E27FC236}">
+                <a16:creationId xmlns:a16="http://schemas.microsoft.com/office/drawing/2014/main" id="{A6A218F6-CFBB-094D-B72B-83E40D36B67E}"/>
+              </a:ext>
+            </a:extLst>
+          </p:cNvPr>
+          <p:cNvSpPr>
+            <a:spLocks noGrp="1"/>
+          </p:cNvSpPr>
+          <p:nvPr>
+            <p:ph idx="1"/>
+          </p:nvPr>
+        </p:nvSpPr>
+        <p:spPr>
+          <a:xfrm>
+            <a:off x="838200" y="1825625"/>
+            <a:ext cx="10515600" cy="4351338"/>
+          </a:xfrm>
+        </p:spPr>
+        <p:txBody>
+          <a:bodyPr/>
+          <a:lstStyle/>
+          <a:p>
+            <a:r>
               <a:rPr lang="el-GR" b="1" dirty="0">
                 <a:latin typeface="Bernino Sans Semibold" pitchFamily="2" charset="77"/>
               </a:rPr>
@@ -13302,7 +14096,79 @@
 </p:sld>
 </file>
 
-<file path=ppt/slides/slide17.xml><?xml version="1.0" encoding="utf-8"?>
+<file path=ppt/slides/slide18.xml><?xml version="1.0" encoding="utf-8"?>
+<p:sld xmlns:a="http://schemas.openxmlformats.org/drawingml/2006/main" xmlns:r="http://schemas.openxmlformats.org/officeDocument/2006/relationships" xmlns:p="http://schemas.openxmlformats.org/presentationml/2006/main">
+  <p:cSld>
+    <p:spTree>
+      <p:nvGrpSpPr>
+        <p:cNvPr id="1" name=""/>
+        <p:cNvGrpSpPr/>
+        <p:nvPr/>
+      </p:nvGrpSpPr>
+      <p:grpSpPr>
+        <a:xfrm>
+          <a:off x="0" y="0"/>
+          <a:ext cx="0" cy="0"/>
+          <a:chOff x="0" y="0"/>
+          <a:chExt cx="0" cy="0"/>
+        </a:xfrm>
+      </p:grpSpPr>
+      <p:sp>
+        <p:nvSpPr>
+          <p:cNvPr id="4" name="Title 3">
+            <a:extLst>
+              <a:ext uri="{FF2B5EF4-FFF2-40B4-BE49-F238E27FC236}">
+                <a16:creationId xmlns:a16="http://schemas.microsoft.com/office/drawing/2014/main" id="{5C39F60E-754F-0CE5-51C8-4CA1D7E6DA0C}"/>
+              </a:ext>
+            </a:extLst>
+          </p:cNvPr>
+          <p:cNvSpPr>
+            <a:spLocks noGrp="1"/>
+          </p:cNvSpPr>
+          <p:nvPr>
+            <p:ph type="title"/>
+          </p:nvPr>
+        </p:nvSpPr>
+        <p:spPr/>
+        <p:txBody>
+          <a:bodyPr/>
+          <a:lstStyle/>
+          <a:p>
+            <a:r>
+              <a:rPr lang="en-FI" dirty="0"/>
+              <a:t>Constructing</a:t>
+            </a:r>
+            <a:br>
+              <a:rPr lang="en-FI" dirty="0"/>
+            </a:br>
+            <a:r>
+              <a:rPr lang="en-FI" dirty="0"/>
+              <a:t>cover-free</a:t>
+            </a:r>
+            <a:br>
+              <a:rPr lang="en-FI" dirty="0"/>
+            </a:br>
+            <a:r>
+              <a:rPr lang="en-FI" dirty="0"/>
+              <a:t>families</a:t>
+            </a:r>
+          </a:p>
+        </p:txBody>
+      </p:sp>
+    </p:spTree>
+    <p:extLst>
+      <p:ext uri="{BB962C8B-B14F-4D97-AF65-F5344CB8AC3E}">
+        <p14:creationId xmlns:p14="http://schemas.microsoft.com/office/powerpoint/2010/main" val="2105726873"/>
+      </p:ext>
+    </p:extLst>
+  </p:cSld>
+  <p:clrMapOvr>
+    <a:masterClrMapping/>
+  </p:clrMapOvr>
+</p:sld>
+</file>
+
+<file path=ppt/slides/slide19.xml><?xml version="1.0" encoding="utf-8"?>
 <p:sld xmlns:a="http://schemas.openxmlformats.org/drawingml/2006/main" xmlns:r="http://schemas.openxmlformats.org/officeDocument/2006/relationships" xmlns:p="http://schemas.openxmlformats.org/presentationml/2006/main">
   <p:cSld>
     <p:spTree>
@@ -14401,7 +15267,152 @@
 </p:sld>
 </file>
 
-<file path=ppt/slides/slide18.xml><?xml version="1.0" encoding="utf-8"?>
+<file path=ppt/slides/slide2.xml><?xml version="1.0" encoding="utf-8"?>
+<p:sld xmlns:a="http://schemas.openxmlformats.org/drawingml/2006/main" xmlns:r="http://schemas.openxmlformats.org/officeDocument/2006/relationships" xmlns:p="http://schemas.openxmlformats.org/presentationml/2006/main">
+  <p:cSld>
+    <p:spTree>
+      <p:nvGrpSpPr>
+        <p:cNvPr id="1" name=""/>
+        <p:cNvGrpSpPr/>
+        <p:nvPr/>
+      </p:nvGrpSpPr>
+      <p:grpSpPr>
+        <a:xfrm>
+          <a:off x="0" y="0"/>
+          <a:ext cx="0" cy="0"/>
+          <a:chOff x="0" y="0"/>
+          <a:chExt cx="0" cy="0"/>
+        </a:xfrm>
+      </p:grpSpPr>
+      <p:sp>
+        <p:nvSpPr>
+          <p:cNvPr id="3" name="Content Placeholder 2">
+            <a:extLst>
+              <a:ext uri="{FF2B5EF4-FFF2-40B4-BE49-F238E27FC236}">
+                <a16:creationId xmlns:a16="http://schemas.microsoft.com/office/drawing/2014/main" id="{2148F739-CBFA-4944-BF9A-CE6B6A7445A8}"/>
+              </a:ext>
+            </a:extLst>
+          </p:cNvPr>
+          <p:cNvSpPr>
+            <a:spLocks noGrp="1"/>
+          </p:cNvSpPr>
+          <p:nvPr>
+            <p:ph idx="1"/>
+          </p:nvPr>
+        </p:nvSpPr>
+        <p:spPr>
+          <a:xfrm>
+            <a:off x="838200" y="365125"/>
+            <a:ext cx="10515600" cy="5811838"/>
+          </a:xfrm>
+        </p:spPr>
+        <p:txBody>
+          <a:bodyPr anchor="ctr"/>
+          <a:lstStyle/>
+          <a:p>
+            <a:pPr marL="0" indent="0" algn="ctr">
+              <a:spcBef>
+                <a:spcPts val="5000"/>
+              </a:spcBef>
+              <a:buNone/>
+            </a:pPr>
+            <a:r>
+              <a:rPr lang="en-US" sz="6400" dirty="0">
+                <a:latin typeface="Bernina Sans Extrabold" pitchFamily="2" charset="77"/>
+              </a:rPr>
+              <a:t>LOCAL model</a:t>
+            </a:r>
+            <a:br>
+              <a:rPr lang="en-US" sz="6400" dirty="0">
+                <a:latin typeface="Bernina Sans Extrabold" pitchFamily="2" charset="77"/>
+              </a:rPr>
+            </a:br>
+            <a:r>
+              <a:rPr lang="en-US" sz="6400" dirty="0">
+                <a:latin typeface="Bernina Sans Extrabold" pitchFamily="2" charset="77"/>
+              </a:rPr>
+              <a:t>=</a:t>
+            </a:r>
+            <a:br>
+              <a:rPr lang="en-US" sz="6400" dirty="0">
+                <a:solidFill>
+                  <a:schemeClr val="accent1"/>
+                </a:solidFill>
+                <a:latin typeface="Bernina Sans Extrabold" pitchFamily="2" charset="77"/>
+              </a:rPr>
+            </a:br>
+            <a:r>
+              <a:rPr lang="en-US" sz="6400" dirty="0">
+                <a:solidFill>
+                  <a:schemeClr val="accent1"/>
+                </a:solidFill>
+                <a:latin typeface="Bernina Sans Extrabold" pitchFamily="2" charset="77"/>
+              </a:rPr>
+              <a:t>port-numbering model</a:t>
+            </a:r>
+            <a:br>
+              <a:rPr lang="en-US" sz="6400" dirty="0">
+                <a:latin typeface="Bernina Sans Extrabold" pitchFamily="2" charset="77"/>
+              </a:rPr>
+            </a:br>
+            <a:r>
+              <a:rPr lang="en-US" sz="6400" dirty="0">
+                <a:latin typeface="Bernina Sans Extrabold" pitchFamily="2" charset="77"/>
+              </a:rPr>
+              <a:t>+ </a:t>
+            </a:r>
+            <a:r>
+              <a:rPr lang="en-US" sz="6400" dirty="0">
+                <a:solidFill>
+                  <a:schemeClr val="accent2"/>
+                </a:solidFill>
+                <a:latin typeface="Bernina Sans Extrabold" pitchFamily="2" charset="77"/>
+              </a:rPr>
+              <a:t>unique identifiers</a:t>
+            </a:r>
+          </a:p>
+          <a:p>
+            <a:pPr marL="0" indent="0" algn="ctr">
+              <a:spcBef>
+                <a:spcPts val="5000"/>
+              </a:spcBef>
+              <a:buNone/>
+            </a:pPr>
+            <a:r>
+              <a:rPr lang="en-US" dirty="0">
+                <a:latin typeface="Bernina Sans Light" pitchFamily="2" charset="77"/>
+              </a:rPr>
+              <a:t>Nodes have distinct labels from {1, 2, …, poly(</a:t>
+            </a:r>
+            <a:r>
+              <a:rPr lang="en-US" i="1" dirty="0">
+                <a:latin typeface="Bernina Sans Light" pitchFamily="2" charset="77"/>
+              </a:rPr>
+              <a:t>n</a:t>
+            </a:r>
+            <a:r>
+              <a:rPr lang="en-US" dirty="0">
+                <a:latin typeface="Bernina Sans Light" pitchFamily="2" charset="77"/>
+              </a:rPr>
+              <a:t>)}</a:t>
+            </a:r>
+          </a:p>
+        </p:txBody>
+      </p:sp>
+    </p:spTree>
+    <p:extLst>
+      <p:ext uri="{BB962C8B-B14F-4D97-AF65-F5344CB8AC3E}">
+        <p14:creationId xmlns:p14="http://schemas.microsoft.com/office/powerpoint/2010/main" val="3146386723"/>
+      </p:ext>
+    </p:extLst>
+  </p:cSld>
+  <p:clrMapOvr>
+    <a:masterClrMapping/>
+  </p:clrMapOvr>
+</p:sld>
+</file>
+
+<file path=ppt/slides/slide20.xml><?xml version="1.0" encoding="utf-8"?>
 <p:sld xmlns:a="http://schemas.openxmlformats.org/drawingml/2006/main" xmlns:r="http://schemas.openxmlformats.org/officeDocument/2006/relationships" xmlns:p="http://schemas.openxmlformats.org/presentationml/2006/main">
   <p:cSld>
     <p:spTree>
@@ -14843,7 +15854,7 @@
 </p:sld>
 </file>
 
-<file path=ppt/slides/slide19.xml><?xml version="1.0" encoding="utf-8"?>
+<file path=ppt/slides/slide21.xml><?xml version="1.0" encoding="utf-8"?>
 <p:sld xmlns:a="http://schemas.openxmlformats.org/drawingml/2006/main" xmlns:r="http://schemas.openxmlformats.org/officeDocument/2006/relationships" xmlns:p="http://schemas.openxmlformats.org/presentationml/2006/main">
   <p:cSld>
     <p:spTree>
@@ -16241,151 +17252,6 @@
     <p:extLst>
       <p:ext uri="{BB962C8B-B14F-4D97-AF65-F5344CB8AC3E}">
         <p14:creationId xmlns:p14="http://schemas.microsoft.com/office/powerpoint/2010/main" val="947919694"/>
-      </p:ext>
-    </p:extLst>
-  </p:cSld>
-  <p:clrMapOvr>
-    <a:masterClrMapping/>
-  </p:clrMapOvr>
-</p:sld>
-</file>
-
-<file path=ppt/slides/slide2.xml><?xml version="1.0" encoding="utf-8"?>
-<p:sld xmlns:a="http://schemas.openxmlformats.org/drawingml/2006/main" xmlns:r="http://schemas.openxmlformats.org/officeDocument/2006/relationships" xmlns:p="http://schemas.openxmlformats.org/presentationml/2006/main">
-  <p:cSld>
-    <p:spTree>
-      <p:nvGrpSpPr>
-        <p:cNvPr id="1" name=""/>
-        <p:cNvGrpSpPr/>
-        <p:nvPr/>
-      </p:nvGrpSpPr>
-      <p:grpSpPr>
-        <a:xfrm>
-          <a:off x="0" y="0"/>
-          <a:ext cx="0" cy="0"/>
-          <a:chOff x="0" y="0"/>
-          <a:chExt cx="0" cy="0"/>
-        </a:xfrm>
-      </p:grpSpPr>
-      <p:sp>
-        <p:nvSpPr>
-          <p:cNvPr id="3" name="Content Placeholder 2">
-            <a:extLst>
-              <a:ext uri="{FF2B5EF4-FFF2-40B4-BE49-F238E27FC236}">
-                <a16:creationId xmlns:a16="http://schemas.microsoft.com/office/drawing/2014/main" id="{2148F739-CBFA-4944-BF9A-CE6B6A7445A8}"/>
-              </a:ext>
-            </a:extLst>
-          </p:cNvPr>
-          <p:cNvSpPr>
-            <a:spLocks noGrp="1"/>
-          </p:cNvSpPr>
-          <p:nvPr>
-            <p:ph idx="1"/>
-          </p:nvPr>
-        </p:nvSpPr>
-        <p:spPr>
-          <a:xfrm>
-            <a:off x="838200" y="365125"/>
-            <a:ext cx="10515600" cy="5811838"/>
-          </a:xfrm>
-        </p:spPr>
-        <p:txBody>
-          <a:bodyPr anchor="ctr"/>
-          <a:lstStyle/>
-          <a:p>
-            <a:pPr marL="0" indent="0" algn="ctr">
-              <a:spcBef>
-                <a:spcPts val="5000"/>
-              </a:spcBef>
-              <a:buNone/>
-            </a:pPr>
-            <a:r>
-              <a:rPr lang="en-US" sz="6400" dirty="0">
-                <a:latin typeface="Bernina Sans Extrabold" pitchFamily="2" charset="77"/>
-              </a:rPr>
-              <a:t>LOCAL model</a:t>
-            </a:r>
-            <a:br>
-              <a:rPr lang="en-US" sz="6400" dirty="0">
-                <a:latin typeface="Bernina Sans Extrabold" pitchFamily="2" charset="77"/>
-              </a:rPr>
-            </a:br>
-            <a:r>
-              <a:rPr lang="en-US" sz="6400" dirty="0">
-                <a:latin typeface="Bernina Sans Extrabold" pitchFamily="2" charset="77"/>
-              </a:rPr>
-              <a:t>=</a:t>
-            </a:r>
-            <a:br>
-              <a:rPr lang="en-US" sz="6400" dirty="0">
-                <a:solidFill>
-                  <a:schemeClr val="accent1"/>
-                </a:solidFill>
-                <a:latin typeface="Bernina Sans Extrabold" pitchFamily="2" charset="77"/>
-              </a:rPr>
-            </a:br>
-            <a:r>
-              <a:rPr lang="en-US" sz="6400" dirty="0">
-                <a:solidFill>
-                  <a:schemeClr val="accent1"/>
-                </a:solidFill>
-                <a:latin typeface="Bernina Sans Extrabold" pitchFamily="2" charset="77"/>
-              </a:rPr>
-              <a:t>port-numbering model</a:t>
-            </a:r>
-            <a:br>
-              <a:rPr lang="en-US" sz="6400" dirty="0">
-                <a:latin typeface="Bernina Sans Extrabold" pitchFamily="2" charset="77"/>
-              </a:rPr>
-            </a:br>
-            <a:r>
-              <a:rPr lang="en-US" sz="6400" dirty="0">
-                <a:latin typeface="Bernina Sans Extrabold" pitchFamily="2" charset="77"/>
-              </a:rPr>
-              <a:t>+ </a:t>
-            </a:r>
-            <a:r>
-              <a:rPr lang="en-US" sz="6400" dirty="0">
-                <a:solidFill>
-                  <a:schemeClr val="accent2"/>
-                </a:solidFill>
-                <a:latin typeface="Bernina Sans Extrabold" pitchFamily="2" charset="77"/>
-              </a:rPr>
-              <a:t>unique identifiers</a:t>
-            </a:r>
-          </a:p>
-          <a:p>
-            <a:pPr marL="0" indent="0" algn="ctr">
-              <a:spcBef>
-                <a:spcPts val="5000"/>
-              </a:spcBef>
-              <a:buNone/>
-            </a:pPr>
-            <a:r>
-              <a:rPr lang="en-US" dirty="0">
-                <a:latin typeface="Bernina Sans Light" pitchFamily="2" charset="77"/>
-              </a:rPr>
-              <a:t>Nodes have distinct labels from {1, 2, …, poly(</a:t>
-            </a:r>
-            <a:r>
-              <a:rPr lang="en-US" i="1" dirty="0">
-                <a:latin typeface="Bernina Sans Light" pitchFamily="2" charset="77"/>
-              </a:rPr>
-              <a:t>n</a:t>
-            </a:r>
-            <a:r>
-              <a:rPr lang="en-US" dirty="0">
-                <a:latin typeface="Bernina Sans Light" pitchFamily="2" charset="77"/>
-              </a:rPr>
-              <a:t>)}</a:t>
-            </a:r>
-          </a:p>
-        </p:txBody>
-      </p:sp>
-    </p:spTree>
-    <p:extLst>
-      <p:ext uri="{BB962C8B-B14F-4D97-AF65-F5344CB8AC3E}">
-        <p14:creationId xmlns:p14="http://schemas.microsoft.com/office/powerpoint/2010/main" val="3146386723"/>
       </p:ext>
     </p:extLst>
   </p:cSld>

</xml_diff>